<commit_message>
Site updated: 2022-07-17 09:37:16
</commit_message>
<xml_diff>
--- a/thumbnails.pptx
+++ b/thumbnails.pptx
@@ -8,6 +8,8 @@
     <p:sldId id="256" r:id="rId2"/>
     <p:sldId id="257" r:id="rId3"/>
     <p:sldId id="258" r:id="rId4"/>
+    <p:sldId id="259" r:id="rId5"/>
+    <p:sldId id="260" r:id="rId6"/>
   </p:sldIdLst>
   <p:sldSz cx="12192000" cy="6858000"/>
   <p:notesSz cx="6858000" cy="9144000"/>
@@ -106,6 +108,11 @@
       </a:defRPr>
     </a:lvl9pPr>
   </p:defaultTextStyle>
+  <p:extLst>
+    <p:ext uri="{EFAFB233-063F-42B5-8137-9DF3F51BA10A}">
+      <p15:sldGuideLst xmlns:p15="http://schemas.microsoft.com/office/powerpoint/2012/main"/>
+    </p:ext>
+  </p:extLst>
 </p:presentation>
 </file>
 
@@ -256,7 +263,7 @@
           <a:p>
             <a:fld id="{FE7E544B-3589-43EF-8FAB-581EFA476AE7}" type="datetimeFigureOut">
               <a:rPr lang="zh-CN" altLang="en-US" smtClean="0"/>
-              <a:t>2022/4/2</a:t>
+              <a:t>2022/7/16</a:t>
             </a:fld>
             <a:endParaRPr lang="zh-CN" altLang="en-US"/>
           </a:p>
@@ -454,7 +461,7 @@
           <a:p>
             <a:fld id="{FE7E544B-3589-43EF-8FAB-581EFA476AE7}" type="datetimeFigureOut">
               <a:rPr lang="zh-CN" altLang="en-US" smtClean="0"/>
-              <a:t>2022/4/2</a:t>
+              <a:t>2022/7/16</a:t>
             </a:fld>
             <a:endParaRPr lang="zh-CN" altLang="en-US"/>
           </a:p>
@@ -662,7 +669,7 @@
           <a:p>
             <a:fld id="{FE7E544B-3589-43EF-8FAB-581EFA476AE7}" type="datetimeFigureOut">
               <a:rPr lang="zh-CN" altLang="en-US" smtClean="0"/>
-              <a:t>2022/4/2</a:t>
+              <a:t>2022/7/16</a:t>
             </a:fld>
             <a:endParaRPr lang="zh-CN" altLang="en-US"/>
           </a:p>
@@ -860,7 +867,7 @@
           <a:p>
             <a:fld id="{FE7E544B-3589-43EF-8FAB-581EFA476AE7}" type="datetimeFigureOut">
               <a:rPr lang="zh-CN" altLang="en-US" smtClean="0"/>
-              <a:t>2022/4/2</a:t>
+              <a:t>2022/7/16</a:t>
             </a:fld>
             <a:endParaRPr lang="zh-CN" altLang="en-US"/>
           </a:p>
@@ -1135,7 +1142,7 @@
           <a:p>
             <a:fld id="{FE7E544B-3589-43EF-8FAB-581EFA476AE7}" type="datetimeFigureOut">
               <a:rPr lang="zh-CN" altLang="en-US" smtClean="0"/>
-              <a:t>2022/4/2</a:t>
+              <a:t>2022/7/16</a:t>
             </a:fld>
             <a:endParaRPr lang="zh-CN" altLang="en-US"/>
           </a:p>
@@ -1400,7 +1407,7 @@
           <a:p>
             <a:fld id="{FE7E544B-3589-43EF-8FAB-581EFA476AE7}" type="datetimeFigureOut">
               <a:rPr lang="zh-CN" altLang="en-US" smtClean="0"/>
-              <a:t>2022/4/2</a:t>
+              <a:t>2022/7/16</a:t>
             </a:fld>
             <a:endParaRPr lang="zh-CN" altLang="en-US"/>
           </a:p>
@@ -1812,7 +1819,7 @@
           <a:p>
             <a:fld id="{FE7E544B-3589-43EF-8FAB-581EFA476AE7}" type="datetimeFigureOut">
               <a:rPr lang="zh-CN" altLang="en-US" smtClean="0"/>
-              <a:t>2022/4/2</a:t>
+              <a:t>2022/7/16</a:t>
             </a:fld>
             <a:endParaRPr lang="zh-CN" altLang="en-US"/>
           </a:p>
@@ -1953,7 +1960,7 @@
           <a:p>
             <a:fld id="{FE7E544B-3589-43EF-8FAB-581EFA476AE7}" type="datetimeFigureOut">
               <a:rPr lang="zh-CN" altLang="en-US" smtClean="0"/>
-              <a:t>2022/4/2</a:t>
+              <a:t>2022/7/16</a:t>
             </a:fld>
             <a:endParaRPr lang="zh-CN" altLang="en-US"/>
           </a:p>
@@ -2066,7 +2073,7 @@
           <a:p>
             <a:fld id="{FE7E544B-3589-43EF-8FAB-581EFA476AE7}" type="datetimeFigureOut">
               <a:rPr lang="zh-CN" altLang="en-US" smtClean="0"/>
-              <a:t>2022/4/2</a:t>
+              <a:t>2022/7/16</a:t>
             </a:fld>
             <a:endParaRPr lang="zh-CN" altLang="en-US"/>
           </a:p>
@@ -2377,7 +2384,7 @@
           <a:p>
             <a:fld id="{FE7E544B-3589-43EF-8FAB-581EFA476AE7}" type="datetimeFigureOut">
               <a:rPr lang="zh-CN" altLang="en-US" smtClean="0"/>
-              <a:t>2022/4/2</a:t>
+              <a:t>2022/7/16</a:t>
             </a:fld>
             <a:endParaRPr lang="zh-CN" altLang="en-US"/>
           </a:p>
@@ -2665,7 +2672,7 @@
           <a:p>
             <a:fld id="{FE7E544B-3589-43EF-8FAB-581EFA476AE7}" type="datetimeFigureOut">
               <a:rPr lang="zh-CN" altLang="en-US" smtClean="0"/>
-              <a:t>2022/4/2</a:t>
+              <a:t>2022/7/16</a:t>
             </a:fld>
             <a:endParaRPr lang="zh-CN" altLang="en-US"/>
           </a:p>
@@ -2906,7 +2913,7 @@
           <a:p>
             <a:fld id="{FE7E544B-3589-43EF-8FAB-581EFA476AE7}" type="datetimeFigureOut">
               <a:rPr lang="zh-CN" altLang="en-US" smtClean="0"/>
-              <a:t>2022/4/2</a:t>
+              <a:t>2022/7/16</a:t>
             </a:fld>
             <a:endParaRPr lang="zh-CN" altLang="en-US"/>
           </a:p>
@@ -3693,6 +3700,235 @@
 </p:sld>
 </file>
 
+<file path=ppt/slides/slide4.xml><?xml version="1.0" encoding="utf-8"?>
+<p:sld xmlns:a="http://schemas.openxmlformats.org/drawingml/2006/main" xmlns:r="http://schemas.openxmlformats.org/officeDocument/2006/relationships" xmlns:p="http://schemas.openxmlformats.org/presentationml/2006/main">
+  <p:cSld>
+    <p:spTree>
+      <p:nvGrpSpPr>
+        <p:cNvPr id="1" name=""/>
+        <p:cNvGrpSpPr/>
+        <p:nvPr/>
+      </p:nvGrpSpPr>
+      <p:grpSpPr>
+        <a:xfrm>
+          <a:off x="0" y="0"/>
+          <a:ext cx="0" cy="0"/>
+          <a:chOff x="0" y="0"/>
+          <a:chExt cx="0" cy="0"/>
+        </a:xfrm>
+      </p:grpSpPr>
+      <p:pic>
+        <p:nvPicPr>
+          <p:cNvPr id="5" name="图片 4">
+            <a:extLst>
+              <a:ext uri="{FF2B5EF4-FFF2-40B4-BE49-F238E27FC236}">
+                <a16:creationId xmlns:a16="http://schemas.microsoft.com/office/drawing/2014/main" id="{1F7D573B-ABC0-4DB5-BC72-6EDDF169EC1C}"/>
+              </a:ext>
+            </a:extLst>
+          </p:cNvPr>
+          <p:cNvPicPr>
+            <a:picLocks noChangeAspect="1"/>
+          </p:cNvPicPr>
+          <p:nvPr/>
+        </p:nvPicPr>
+        <p:blipFill>
+          <a:blip r:embed="rId2">
+            <a:extLst>
+              <a:ext uri="{28A0092B-C50C-407E-A947-70E740481C1C}">
+                <a14:useLocalDpi xmlns:a14="http://schemas.microsoft.com/office/drawing/2010/main" val="0"/>
+              </a:ext>
+            </a:extLst>
+          </a:blip>
+          <a:stretch>
+            <a:fillRect/>
+          </a:stretch>
+        </p:blipFill>
+        <p:spPr>
+          <a:xfrm>
+            <a:off x="1230758" y="750053"/>
+            <a:ext cx="9525000" cy="5613400"/>
+          </a:xfrm>
+          <a:prstGeom prst="rect">
+            <a:avLst/>
+          </a:prstGeom>
+        </p:spPr>
+      </p:pic>
+      <p:sp>
+        <p:nvSpPr>
+          <p:cNvPr id="2" name="标题 1">
+            <a:extLst>
+              <a:ext uri="{FF2B5EF4-FFF2-40B4-BE49-F238E27FC236}">
+                <a16:creationId xmlns:a16="http://schemas.microsoft.com/office/drawing/2014/main" id="{9E7B0B54-F16C-4E87-A79D-2EB49CA23F4F}"/>
+              </a:ext>
+            </a:extLst>
+          </p:cNvPr>
+          <p:cNvSpPr>
+            <a:spLocks noGrp="1"/>
+          </p:cNvSpPr>
+          <p:nvPr>
+            <p:ph type="title"/>
+          </p:nvPr>
+        </p:nvSpPr>
+        <p:spPr>
+          <a:xfrm>
+            <a:off x="2378350" y="1897527"/>
+            <a:ext cx="7624631" cy="1940183"/>
+          </a:xfrm>
+        </p:spPr>
+        <p:txBody>
+          <a:bodyPr>
+            <a:normAutofit/>
+          </a:bodyPr>
+          <a:lstStyle/>
+          <a:p>
+            <a:r>
+              <a:rPr lang="zh-CN" altLang="en-US" sz="6000" b="1" spc="500" dirty="0"/>
+              <a:t>杀死</a:t>
+            </a:r>
+            <a:r>
+              <a:rPr lang="zh-CN" altLang="en-US" sz="6000" b="1" spc="500" dirty="0">
+                <a:solidFill>
+                  <a:schemeClr val="bg1"/>
+                </a:solidFill>
+              </a:rPr>
+              <a:t>一只知更</a:t>
+            </a:r>
+            <a:r>
+              <a:rPr lang="zh-CN" altLang="en-US" sz="6000" b="1" spc="500" dirty="0"/>
+              <a:t>鸟</a:t>
+            </a:r>
+          </a:p>
+        </p:txBody>
+      </p:sp>
+    </p:spTree>
+    <p:extLst>
+      <p:ext uri="{BB962C8B-B14F-4D97-AF65-F5344CB8AC3E}">
+        <p14:creationId xmlns:p14="http://schemas.microsoft.com/office/powerpoint/2010/main" val="3025780781"/>
+      </p:ext>
+    </p:extLst>
+  </p:cSld>
+  <p:clrMapOvr>
+    <a:masterClrMapping/>
+  </p:clrMapOvr>
+</p:sld>
+</file>
+
+<file path=ppt/slides/slide5.xml><?xml version="1.0" encoding="utf-8"?>
+<p:sld xmlns:a="http://schemas.openxmlformats.org/drawingml/2006/main" xmlns:r="http://schemas.openxmlformats.org/officeDocument/2006/relationships" xmlns:p="http://schemas.openxmlformats.org/presentationml/2006/main">
+  <p:cSld>
+    <p:spTree>
+      <p:nvGrpSpPr>
+        <p:cNvPr id="1" name=""/>
+        <p:cNvGrpSpPr/>
+        <p:nvPr/>
+      </p:nvGrpSpPr>
+      <p:grpSpPr>
+        <a:xfrm>
+          <a:off x="0" y="0"/>
+          <a:ext cx="0" cy="0"/>
+          <a:chOff x="0" y="0"/>
+          <a:chExt cx="0" cy="0"/>
+        </a:xfrm>
+      </p:grpSpPr>
+      <p:pic>
+        <p:nvPicPr>
+          <p:cNvPr id="5" name="图片 4">
+            <a:extLst>
+              <a:ext uri="{FF2B5EF4-FFF2-40B4-BE49-F238E27FC236}">
+                <a16:creationId xmlns:a16="http://schemas.microsoft.com/office/drawing/2014/main" id="{E0A036E7-8647-B97B-BAC1-A09339C6EA1A}"/>
+              </a:ext>
+            </a:extLst>
+          </p:cNvPr>
+          <p:cNvPicPr>
+            <a:picLocks noChangeAspect="1"/>
+          </p:cNvPicPr>
+          <p:nvPr/>
+        </p:nvPicPr>
+        <p:blipFill>
+          <a:blip r:embed="rId2">
+            <a:extLst>
+              <a:ext uri="{28A0092B-C50C-407E-A947-70E740481C1C}">
+                <a14:useLocalDpi xmlns:a14="http://schemas.microsoft.com/office/drawing/2010/main" val="0"/>
+              </a:ext>
+            </a:extLst>
+          </a:blip>
+          <a:stretch>
+            <a:fillRect/>
+          </a:stretch>
+        </p:blipFill>
+        <p:spPr>
+          <a:xfrm>
+            <a:off x="2532815" y="1101436"/>
+            <a:ext cx="7126370" cy="4655128"/>
+          </a:xfrm>
+          <a:prstGeom prst="rect">
+            <a:avLst/>
+          </a:prstGeom>
+        </p:spPr>
+      </p:pic>
+      <p:sp>
+        <p:nvSpPr>
+          <p:cNvPr id="6" name="文本框 5">
+            <a:extLst>
+              <a:ext uri="{FF2B5EF4-FFF2-40B4-BE49-F238E27FC236}">
+                <a16:creationId xmlns:a16="http://schemas.microsoft.com/office/drawing/2014/main" id="{02655F64-A1F8-82D0-5D13-515CC4416BDF}"/>
+              </a:ext>
+            </a:extLst>
+          </p:cNvPr>
+          <p:cNvSpPr txBox="1"/>
+          <p:nvPr/>
+        </p:nvSpPr>
+        <p:spPr>
+          <a:xfrm>
+            <a:off x="3941618" y="3593069"/>
+            <a:ext cx="3553691" cy="646331"/>
+          </a:xfrm>
+          <a:prstGeom prst="rect">
+            <a:avLst/>
+          </a:prstGeom>
+          <a:noFill/>
+        </p:spPr>
+        <p:txBody>
+          <a:bodyPr wrap="square" rtlCol="0">
+            <a:spAutoFit/>
+          </a:bodyPr>
+          <a:lstStyle/>
+          <a:p>
+            <a:r>
+              <a:rPr lang="en-US" altLang="zh-CN" sz="3600" dirty="0">
+                <a:solidFill>
+                  <a:schemeClr val="bg1">
+                    <a:lumMod val="85000"/>
+                  </a:schemeClr>
+                </a:solidFill>
+                <a:latin typeface="Bauhaus 93" panose="04030905020B02020C02" pitchFamily="82" charset="0"/>
+              </a:rPr>
+              <a:t>Database IPC</a:t>
+            </a:r>
+            <a:endParaRPr lang="zh-CN" altLang="en-US" sz="3600" dirty="0">
+              <a:solidFill>
+                <a:schemeClr val="bg1">
+                  <a:lumMod val="85000"/>
+                </a:schemeClr>
+              </a:solidFill>
+              <a:latin typeface="Bauhaus 93" panose="04030905020B02020C02" pitchFamily="82" charset="0"/>
+            </a:endParaRPr>
+          </a:p>
+        </p:txBody>
+      </p:sp>
+    </p:spTree>
+    <p:extLst>
+      <p:ext uri="{BB962C8B-B14F-4D97-AF65-F5344CB8AC3E}">
+        <p14:creationId xmlns:p14="http://schemas.microsoft.com/office/powerpoint/2010/main" val="2304681535"/>
+      </p:ext>
+    </p:extLst>
+  </p:cSld>
+  <p:clrMapOvr>
+    <a:masterClrMapping/>
+  </p:clrMapOvr>
+</p:sld>
+</file>
+
 <file path=ppt/theme/theme1.xml><?xml version="1.0" encoding="utf-8"?>
 <a:theme xmlns:a="http://schemas.openxmlformats.org/drawingml/2006/main" name="Office 主题​​">
   <a:themeElements>

</xml_diff>

<commit_message>
Site updated: 2022-08-05 20:57:32
</commit_message>
<xml_diff>
--- a/thumbnails.pptx
+++ b/thumbnails.pptx
@@ -10,6 +10,7 @@
     <p:sldId id="258" r:id="rId4"/>
     <p:sldId id="259" r:id="rId5"/>
     <p:sldId id="260" r:id="rId6"/>
+    <p:sldId id="261" r:id="rId7"/>
   </p:sldIdLst>
   <p:sldSz cx="12192000" cy="6858000"/>
   <p:notesSz cx="6858000" cy="9144000"/>
@@ -263,7 +264,7 @@
           <a:p>
             <a:fld id="{FE7E544B-3589-43EF-8FAB-581EFA476AE7}" type="datetimeFigureOut">
               <a:rPr lang="zh-CN" altLang="en-US" smtClean="0"/>
-              <a:t>2022/7/16</a:t>
+              <a:t>2022/8/4</a:t>
             </a:fld>
             <a:endParaRPr lang="zh-CN" altLang="en-US"/>
           </a:p>
@@ -461,7 +462,7 @@
           <a:p>
             <a:fld id="{FE7E544B-3589-43EF-8FAB-581EFA476AE7}" type="datetimeFigureOut">
               <a:rPr lang="zh-CN" altLang="en-US" smtClean="0"/>
-              <a:t>2022/7/16</a:t>
+              <a:t>2022/8/4</a:t>
             </a:fld>
             <a:endParaRPr lang="zh-CN" altLang="en-US"/>
           </a:p>
@@ -669,7 +670,7 @@
           <a:p>
             <a:fld id="{FE7E544B-3589-43EF-8FAB-581EFA476AE7}" type="datetimeFigureOut">
               <a:rPr lang="zh-CN" altLang="en-US" smtClean="0"/>
-              <a:t>2022/7/16</a:t>
+              <a:t>2022/8/4</a:t>
             </a:fld>
             <a:endParaRPr lang="zh-CN" altLang="en-US"/>
           </a:p>
@@ -867,7 +868,7 @@
           <a:p>
             <a:fld id="{FE7E544B-3589-43EF-8FAB-581EFA476AE7}" type="datetimeFigureOut">
               <a:rPr lang="zh-CN" altLang="en-US" smtClean="0"/>
-              <a:t>2022/7/16</a:t>
+              <a:t>2022/8/4</a:t>
             </a:fld>
             <a:endParaRPr lang="zh-CN" altLang="en-US"/>
           </a:p>
@@ -1142,7 +1143,7 @@
           <a:p>
             <a:fld id="{FE7E544B-3589-43EF-8FAB-581EFA476AE7}" type="datetimeFigureOut">
               <a:rPr lang="zh-CN" altLang="en-US" smtClean="0"/>
-              <a:t>2022/7/16</a:t>
+              <a:t>2022/8/4</a:t>
             </a:fld>
             <a:endParaRPr lang="zh-CN" altLang="en-US"/>
           </a:p>
@@ -1407,7 +1408,7 @@
           <a:p>
             <a:fld id="{FE7E544B-3589-43EF-8FAB-581EFA476AE7}" type="datetimeFigureOut">
               <a:rPr lang="zh-CN" altLang="en-US" smtClean="0"/>
-              <a:t>2022/7/16</a:t>
+              <a:t>2022/8/4</a:t>
             </a:fld>
             <a:endParaRPr lang="zh-CN" altLang="en-US"/>
           </a:p>
@@ -1819,7 +1820,7 @@
           <a:p>
             <a:fld id="{FE7E544B-3589-43EF-8FAB-581EFA476AE7}" type="datetimeFigureOut">
               <a:rPr lang="zh-CN" altLang="en-US" smtClean="0"/>
-              <a:t>2022/7/16</a:t>
+              <a:t>2022/8/4</a:t>
             </a:fld>
             <a:endParaRPr lang="zh-CN" altLang="en-US"/>
           </a:p>
@@ -1960,7 +1961,7 @@
           <a:p>
             <a:fld id="{FE7E544B-3589-43EF-8FAB-581EFA476AE7}" type="datetimeFigureOut">
               <a:rPr lang="zh-CN" altLang="en-US" smtClean="0"/>
-              <a:t>2022/7/16</a:t>
+              <a:t>2022/8/4</a:t>
             </a:fld>
             <a:endParaRPr lang="zh-CN" altLang="en-US"/>
           </a:p>
@@ -2073,7 +2074,7 @@
           <a:p>
             <a:fld id="{FE7E544B-3589-43EF-8FAB-581EFA476AE7}" type="datetimeFigureOut">
               <a:rPr lang="zh-CN" altLang="en-US" smtClean="0"/>
-              <a:t>2022/7/16</a:t>
+              <a:t>2022/8/4</a:t>
             </a:fld>
             <a:endParaRPr lang="zh-CN" altLang="en-US"/>
           </a:p>
@@ -2384,7 +2385,7 @@
           <a:p>
             <a:fld id="{FE7E544B-3589-43EF-8FAB-581EFA476AE7}" type="datetimeFigureOut">
               <a:rPr lang="zh-CN" altLang="en-US" smtClean="0"/>
-              <a:t>2022/7/16</a:t>
+              <a:t>2022/8/4</a:t>
             </a:fld>
             <a:endParaRPr lang="zh-CN" altLang="en-US"/>
           </a:p>
@@ -2672,7 +2673,7 @@
           <a:p>
             <a:fld id="{FE7E544B-3589-43EF-8FAB-581EFA476AE7}" type="datetimeFigureOut">
               <a:rPr lang="zh-CN" altLang="en-US" smtClean="0"/>
-              <a:t>2022/7/16</a:t>
+              <a:t>2022/8/4</a:t>
             </a:fld>
             <a:endParaRPr lang="zh-CN" altLang="en-US"/>
           </a:p>
@@ -2913,7 +2914,7 @@
           <a:p>
             <a:fld id="{FE7E544B-3589-43EF-8FAB-581EFA476AE7}" type="datetimeFigureOut">
               <a:rPr lang="zh-CN" altLang="en-US" smtClean="0"/>
-              <a:t>2022/7/16</a:t>
+              <a:t>2022/8/4</a:t>
             </a:fld>
             <a:endParaRPr lang="zh-CN" altLang="en-US"/>
           </a:p>
@@ -3929,6 +3930,71 @@
 </p:sld>
 </file>
 
+<file path=ppt/slides/slide6.xml><?xml version="1.0" encoding="utf-8"?>
+<p:sld xmlns:a="http://schemas.openxmlformats.org/drawingml/2006/main" xmlns:r="http://schemas.openxmlformats.org/officeDocument/2006/relationships" xmlns:p="http://schemas.openxmlformats.org/presentationml/2006/main">
+  <p:cSld>
+    <p:spTree>
+      <p:nvGrpSpPr>
+        <p:cNvPr id="1" name=""/>
+        <p:cNvGrpSpPr/>
+        <p:nvPr/>
+      </p:nvGrpSpPr>
+      <p:grpSpPr>
+        <a:xfrm>
+          <a:off x="0" y="0"/>
+          <a:ext cx="0" cy="0"/>
+          <a:chOff x="0" y="0"/>
+          <a:chExt cx="0" cy="0"/>
+        </a:xfrm>
+      </p:grpSpPr>
+      <p:pic>
+        <p:nvPicPr>
+          <p:cNvPr id="5" name="内容占位符 4">
+            <a:extLst>
+              <a:ext uri="{FF2B5EF4-FFF2-40B4-BE49-F238E27FC236}">
+                <a16:creationId xmlns:a16="http://schemas.microsoft.com/office/drawing/2014/main" id="{2D048603-A565-CE8D-5765-5B0AB1AC0F51}"/>
+              </a:ext>
+            </a:extLst>
+          </p:cNvPr>
+          <p:cNvPicPr>
+            <a:picLocks noGrp="1" noChangeAspect="1"/>
+          </p:cNvPicPr>
+          <p:nvPr>
+            <p:ph idx="1"/>
+          </p:nvPr>
+        </p:nvPicPr>
+        <p:blipFill>
+          <a:blip r:embed="rId2">
+            <a:extLst>
+              <a:ext uri="{28A0092B-C50C-407E-A947-70E740481C1C}">
+                <a14:useLocalDpi xmlns:a14="http://schemas.microsoft.com/office/drawing/2010/main" val="0"/>
+              </a:ext>
+            </a:extLst>
+          </a:blip>
+          <a:stretch>
+            <a:fillRect/>
+          </a:stretch>
+        </p:blipFill>
+        <p:spPr>
+          <a:xfrm>
+            <a:off x="2527696" y="1326862"/>
+            <a:ext cx="6527007" cy="4351338"/>
+          </a:xfrm>
+        </p:spPr>
+      </p:pic>
+    </p:spTree>
+    <p:extLst>
+      <p:ext uri="{BB962C8B-B14F-4D97-AF65-F5344CB8AC3E}">
+        <p14:creationId xmlns:p14="http://schemas.microsoft.com/office/powerpoint/2010/main" val="2947460135"/>
+      </p:ext>
+    </p:extLst>
+  </p:cSld>
+  <p:clrMapOvr>
+    <a:masterClrMapping/>
+  </p:clrMapOvr>
+</p:sld>
+</file>
+
 <file path=ppt/theme/theme1.xml><?xml version="1.0" encoding="utf-8"?>
 <a:theme xmlns:a="http://schemas.openxmlformats.org/drawingml/2006/main" name="Office 主题​​">
   <a:themeElements>

</xml_diff>